<commit_message>
Centered Section Slide title better
</commit_message>
<xml_diff>
--- a/Martin Template.pptx
+++ b/Martin Template.pptx
@@ -208,7 +208,7 @@
           <a:p>
             <a:fld id="{7ABD78BF-0394-D549-A535-A40133B5DC51}" type="datetimeFigureOut">
               <a:rPr lang="en-US" smtClean="0"/>
-              <a:t>4/5/20</a:t>
+              <a:t>2/28/22</a:t>
             </a:fld>
             <a:endParaRPr lang="en-US"/>
           </a:p>
@@ -612,7 +612,7 @@
           <a:p>
             <a:fld id="{23133D12-CE5E-6B41-8E9D-91EDFBAFC85F}" type="datetime1">
               <a:rPr lang="en-GB" smtClean="0"/>
-              <a:t>05/04/2020</a:t>
+              <a:t>28/02/2022</a:t>
             </a:fld>
             <a:endParaRPr lang="en-US"/>
           </a:p>
@@ -785,7 +785,7 @@
           <a:p>
             <a:fld id="{305404EF-A919-EC45-85DB-57CE605E88BB}" type="datetime1">
               <a:rPr lang="en-GB" smtClean="0"/>
-              <a:t>05/04/2020</a:t>
+              <a:t>28/02/2022</a:t>
             </a:fld>
             <a:endParaRPr lang="en-US"/>
           </a:p>
@@ -968,7 +968,7 @@
           <a:p>
             <a:fld id="{69EC58A9-E6BC-7F41-94AC-B8DAC026E873}" type="datetime1">
               <a:rPr lang="en-GB" smtClean="0"/>
-              <a:t>05/04/2020</a:t>
+              <a:t>28/02/2022</a:t>
             </a:fld>
             <a:endParaRPr lang="en-US"/>
           </a:p>
@@ -1061,8 +1061,8 @@
         </p:nvSpPr>
         <p:spPr>
           <a:xfrm>
-            <a:off x="831850" y="1709738"/>
-            <a:ext cx="10515600" cy="2852737"/>
+            <a:off x="831850" y="1709739"/>
+            <a:ext cx="10515600" cy="2181542"/>
           </a:xfrm>
         </p:spPr>
         <p:txBody>
@@ -1218,7 +1218,7 @@
           <a:p>
             <a:fld id="{F0A73D1F-7830-B741-BC96-A837CBC9E079}" type="datetime1">
               <a:rPr lang="en-GB" smtClean="0"/>
-              <a:t>05/04/2020</a:t>
+              <a:t>28/02/2022</a:t>
             </a:fld>
             <a:endParaRPr lang="en-US"/>
           </a:p>
@@ -1418,7 +1418,7 @@
           <a:p>
             <a:fld id="{7BEC13FA-6531-0245-A446-9EAD81E0D53B}" type="datetime1">
               <a:rPr lang="en-GB" smtClean="0"/>
-              <a:t>05/04/2020</a:t>
+              <a:t>28/02/2022</a:t>
             </a:fld>
             <a:endParaRPr lang="en-US"/>
           </a:p>
@@ -1652,7 +1652,7 @@
           <a:p>
             <a:fld id="{DEE6DD8A-E471-384F-883D-F219A186BE0F}" type="datetime1">
               <a:rPr lang="en-GB" smtClean="0"/>
-              <a:t>05/04/2020</a:t>
+              <a:t>28/02/2022</a:t>
             </a:fld>
             <a:endParaRPr lang="en-US"/>
           </a:p>
@@ -2022,7 +2022,7 @@
           <a:p>
             <a:fld id="{FC2C274D-85F4-2344-8F58-DEA89BF0D7C7}" type="datetime1">
               <a:rPr lang="en-GB" smtClean="0"/>
-              <a:t>05/04/2020</a:t>
+              <a:t>28/02/2022</a:t>
             </a:fld>
             <a:endParaRPr lang="en-US"/>
           </a:p>
@@ -2143,7 +2143,7 @@
           <a:p>
             <a:fld id="{8686350E-419E-7C4C-BD45-32442656A010}" type="datetime1">
               <a:rPr lang="en-GB" smtClean="0"/>
-              <a:t>05/04/2020</a:t>
+              <a:t>28/02/2022</a:t>
             </a:fld>
             <a:endParaRPr lang="en-US"/>
           </a:p>
@@ -2241,7 +2241,7 @@
           <a:p>
             <a:fld id="{C2B231B4-F3B9-2E43-AEE7-50097B5E42D8}" type="datetime1">
               <a:rPr lang="en-GB" smtClean="0"/>
-              <a:t>05/04/2020</a:t>
+              <a:t>28/02/2022</a:t>
             </a:fld>
             <a:endParaRPr lang="en-US"/>
           </a:p>
@@ -2521,7 +2521,7 @@
           <a:p>
             <a:fld id="{BA606DA0-7E1E-D24A-B31F-F1C778CBD10F}" type="datetime1">
               <a:rPr lang="en-GB" smtClean="0"/>
-              <a:t>05/04/2020</a:t>
+              <a:t>28/02/2022</a:t>
             </a:fld>
             <a:endParaRPr lang="en-US"/>
           </a:p>
@@ -2781,7 +2781,7 @@
           <a:p>
             <a:fld id="{9DF9E593-3AEE-9148-B659-A83BC92509F8}" type="datetime1">
               <a:rPr lang="en-GB" smtClean="0"/>
-              <a:t>05/04/2020</a:t>
+              <a:t>28/02/2022</a:t>
             </a:fld>
             <a:endParaRPr lang="en-US"/>
           </a:p>
@@ -2995,7 +2995,7 @@
           <a:p>
             <a:fld id="{B4F538D9-71E6-DF45-AEE6-3D5D1058FDA2}" type="datetime1">
               <a:rPr lang="en-GB" smtClean="0"/>
-              <a:t>05/04/2020</a:t>
+              <a:t>28/02/2022</a:t>
             </a:fld>
             <a:endParaRPr lang="en-US"/>
           </a:p>
@@ -3409,7 +3409,13 @@
       </p:grpSpPr>
       <p:sp>
         <p:nvSpPr>
-          <p:cNvPr id="2" name="Title 1"/>
+          <p:cNvPr id="5" name="Title 4">
+            <a:extLst>
+              <a:ext uri="{FF2B5EF4-FFF2-40B4-BE49-F238E27FC236}">
+                <a16:creationId xmlns:a16="http://schemas.microsoft.com/office/drawing/2014/main" id="{B5992BF2-46A2-1C46-85E4-A27A855604B8}"/>
+              </a:ext>
+            </a:extLst>
+          </p:cNvPr>
           <p:cNvSpPr>
             <a:spLocks noGrp="1"/>
           </p:cNvSpPr>
@@ -3419,18 +3425,22 @@
         </p:nvSpPr>
         <p:spPr/>
         <p:txBody>
-          <a:bodyPr>
-            <a:normAutofit/>
-          </a:bodyPr>
-          <a:lstStyle/>
-          <a:p>
-            <a:endParaRPr lang="en-US"/>
-          </a:p>
-        </p:txBody>
-      </p:sp>
-      <p:sp>
-        <p:nvSpPr>
-          <p:cNvPr id="3" name="Content Placeholder 2"/>
+          <a:bodyPr/>
+          <a:lstStyle/>
+          <a:p>
+            <a:endParaRPr lang="en-GB"/>
+          </a:p>
+        </p:txBody>
+      </p:sp>
+      <p:sp>
+        <p:nvSpPr>
+          <p:cNvPr id="6" name="Content Placeholder 5">
+            <a:extLst>
+              <a:ext uri="{FF2B5EF4-FFF2-40B4-BE49-F238E27FC236}">
+                <a16:creationId xmlns:a16="http://schemas.microsoft.com/office/drawing/2014/main" id="{5146DE35-D242-8446-9885-35EC3CA9FB52}"/>
+              </a:ext>
+            </a:extLst>
+          </p:cNvPr>
           <p:cNvSpPr>
             <a:spLocks noGrp="1"/>
           </p:cNvSpPr>
@@ -3438,19 +3448,12 @@
             <p:ph idx="1"/>
           </p:nvPr>
         </p:nvSpPr>
-        <p:spPr>
-          <a:xfrm>
-            <a:off x="2152650" y="914400"/>
-            <a:ext cx="7886700" cy="383182"/>
-          </a:xfrm>
-        </p:spPr>
-        <p:txBody>
-          <a:bodyPr>
-            <a:normAutofit fontScale="85000" lnSpcReduction="20000"/>
-          </a:bodyPr>
-          <a:lstStyle/>
-          <a:p>
-            <a:endParaRPr lang="en-US"/>
+        <p:spPr/>
+        <p:txBody>
+          <a:bodyPr/>
+          <a:lstStyle/>
+          <a:p>
+            <a:endParaRPr lang="en-GB"/>
           </a:p>
         </p:txBody>
       </p:sp>

</xml_diff>